<commit_message>
all samples created and PPT updated with Animation
</commit_message>
<xml_diff>
--- a/Playwright Automation training PPT.pptx
+++ b/Playwright Automation training PPT.pptx
@@ -376,6 +376,11 @@
       </a:defRPr>
     </a:lvl9pPr>
   </p:defaultTextStyle>
+  <p:extLst>
+    <p:ext uri="{EFAFB233-063F-42B5-8137-9DF3F51BA10A}">
+      <p15:sldGuideLst xmlns:p15="http://schemas.microsoft.com/office/powerpoint/2012/main"/>
+    </p:ext>
+  </p:extLst>
 </p:presentation>
 </file>
 
@@ -518,7 +523,7 @@
           <a:p>
             <a:fld id="{277C0EA7-384B-48A7-9E6B-FE2AA406287D}" type="datetimeFigureOut">
               <a:rPr lang="en-IN" smtClean="0"/>
-              <a:t>09-03-2024</a:t>
+              <a:t>10-03-2024</a:t>
             </a:fld>
             <a:endParaRPr lang="en-IN"/>
           </a:p>
@@ -729,7 +734,7 @@
           <a:p>
             <a:fld id="{277C0EA7-384B-48A7-9E6B-FE2AA406287D}" type="datetimeFigureOut">
               <a:rPr lang="en-IN" smtClean="0"/>
-              <a:t>09-03-2024</a:t>
+              <a:t>10-03-2024</a:t>
             </a:fld>
             <a:endParaRPr lang="en-IN"/>
           </a:p>
@@ -944,7 +949,7 @@
           <a:p>
             <a:fld id="{277C0EA7-384B-48A7-9E6B-FE2AA406287D}" type="datetimeFigureOut">
               <a:rPr lang="en-IN" smtClean="0"/>
-              <a:t>09-03-2024</a:t>
+              <a:t>10-03-2024</a:t>
             </a:fld>
             <a:endParaRPr lang="en-IN"/>
           </a:p>
@@ -1145,7 +1150,7 @@
           <a:p>
             <a:fld id="{277C0EA7-384B-48A7-9E6B-FE2AA406287D}" type="datetimeFigureOut">
               <a:rPr lang="en-IN" smtClean="0"/>
-              <a:t>09-03-2024</a:t>
+              <a:t>10-03-2024</a:t>
             </a:fld>
             <a:endParaRPr lang="en-IN"/>
           </a:p>
@@ -1424,7 +1429,7 @@
           <a:p>
             <a:fld id="{277C0EA7-384B-48A7-9E6B-FE2AA406287D}" type="datetimeFigureOut">
               <a:rPr lang="en-IN" smtClean="0"/>
-              <a:t>09-03-2024</a:t>
+              <a:t>10-03-2024</a:t>
             </a:fld>
             <a:endParaRPr lang="en-IN"/>
           </a:p>
@@ -1692,7 +1697,7 @@
           <a:p>
             <a:fld id="{277C0EA7-384B-48A7-9E6B-FE2AA406287D}" type="datetimeFigureOut">
               <a:rPr lang="en-IN" smtClean="0"/>
-              <a:t>09-03-2024</a:t>
+              <a:t>10-03-2024</a:t>
             </a:fld>
             <a:endParaRPr lang="en-IN"/>
           </a:p>
@@ -2108,7 +2113,7 @@
           <a:p>
             <a:fld id="{277C0EA7-384B-48A7-9E6B-FE2AA406287D}" type="datetimeFigureOut">
               <a:rPr lang="en-IN" smtClean="0"/>
-              <a:t>09-03-2024</a:t>
+              <a:t>10-03-2024</a:t>
             </a:fld>
             <a:endParaRPr lang="en-IN"/>
           </a:p>
@@ -2257,7 +2262,7 @@
           <a:p>
             <a:fld id="{277C0EA7-384B-48A7-9E6B-FE2AA406287D}" type="datetimeFigureOut">
               <a:rPr lang="en-IN" smtClean="0"/>
-              <a:t>09-03-2024</a:t>
+              <a:t>10-03-2024</a:t>
             </a:fld>
             <a:endParaRPr lang="en-IN"/>
           </a:p>
@@ -2383,7 +2388,7 @@
           <a:p>
             <a:fld id="{277C0EA7-384B-48A7-9E6B-FE2AA406287D}" type="datetimeFigureOut">
               <a:rPr lang="en-IN" smtClean="0"/>
-              <a:t>09-03-2024</a:t>
+              <a:t>10-03-2024</a:t>
             </a:fld>
             <a:endParaRPr lang="en-IN"/>
           </a:p>
@@ -2634,7 +2639,7 @@
           <a:p>
             <a:fld id="{277C0EA7-384B-48A7-9E6B-FE2AA406287D}" type="datetimeFigureOut">
               <a:rPr lang="en-IN" smtClean="0"/>
-              <a:t>09-03-2024</a:t>
+              <a:t>10-03-2024</a:t>
             </a:fld>
             <a:endParaRPr lang="en-IN"/>
           </a:p>
@@ -3079,7 +3084,7 @@
           <a:p>
             <a:fld id="{277C0EA7-384B-48A7-9E6B-FE2AA406287D}" type="datetimeFigureOut">
               <a:rPr lang="en-IN" smtClean="0"/>
-              <a:t>09-03-2024</a:t>
+              <a:t>10-03-2024</a:t>
             </a:fld>
             <a:endParaRPr lang="en-IN"/>
           </a:p>
@@ -3405,7 +3410,7 @@
           <a:p>
             <a:fld id="{277C0EA7-384B-48A7-9E6B-FE2AA406287D}" type="datetimeFigureOut">
               <a:rPr lang="en-IN" smtClean="0"/>
-              <a:t>09-03-2024</a:t>
+              <a:t>10-03-2024</a:t>
             </a:fld>
             <a:endParaRPr lang="en-IN"/>
           </a:p>
@@ -3545,6 +3550,442 @@
     <p:sldLayoutId id="2147483670" r:id="rId10"/>
     <p:sldLayoutId id="2147483671" r:id="rId11"/>
   </p:sldLayoutIdLst>
+  <p:timing>
+    <p:tnLst>
+      <p:par>
+        <p:cTn id="1" dur="indefinite" restart="never" nodeType="tmRoot">
+          <p:childTnLst>
+            <p:seq concurrent="1" nextAc="seek">
+              <p:cTn id="2" dur="indefinite" nodeType="mainSeq">
+                <p:childTnLst>
+                  <p:par>
+                    <p:cTn id="3" fill="hold">
+                      <p:stCondLst>
+                        <p:cond delay="indefinite"/>
+                      </p:stCondLst>
+                      <p:childTnLst>
+                        <p:par>
+                          <p:cTn id="4" fill="hold">
+                            <p:stCondLst>
+                              <p:cond delay="0"/>
+                            </p:stCondLst>
+                            <p:childTnLst>
+                              <p:par>
+                                <p:cTn id="5" presetID="1" presetClass="entr" presetSubtype="0" fill="hold" grpId="0" nodeType="clickEffect">
+                                  <p:stCondLst>
+                                    <p:cond delay="0"/>
+                                  </p:stCondLst>
+                                  <p:childTnLst>
+                                    <p:set>
+                                      <p:cBhvr>
+                                        <p:cTn id="6" dur="1" fill="hold">
+                                          <p:stCondLst>
+                                            <p:cond delay="0"/>
+                                          </p:stCondLst>
+                                        </p:cTn>
+                                        <p:tgtEl>
+                                          <p:spTgt spid="3">
+                                            <p:txEl>
+                                              <p:pRg st="0" end="0"/>
+                                            </p:txEl>
+                                          </p:spTgt>
+                                        </p:tgtEl>
+                                        <p:attrNameLst>
+                                          <p:attrName>style.visibility</p:attrName>
+                                        </p:attrNameLst>
+                                      </p:cBhvr>
+                                      <p:to>
+                                        <p:strVal val="visible"/>
+                                      </p:to>
+                                    </p:set>
+                                  </p:childTnLst>
+                                </p:cTn>
+                              </p:par>
+                            </p:childTnLst>
+                          </p:cTn>
+                        </p:par>
+                      </p:childTnLst>
+                    </p:cTn>
+                  </p:par>
+                  <p:par>
+                    <p:cTn id="7" fill="hold">
+                      <p:stCondLst>
+                        <p:cond delay="indefinite"/>
+                      </p:stCondLst>
+                      <p:childTnLst>
+                        <p:par>
+                          <p:cTn id="8" fill="hold">
+                            <p:stCondLst>
+                              <p:cond delay="0"/>
+                            </p:stCondLst>
+                            <p:childTnLst>
+                              <p:par>
+                                <p:cTn id="9" presetID="1" presetClass="entr" presetSubtype="0" fill="hold" grpId="0" nodeType="clickEffect">
+                                  <p:stCondLst>
+                                    <p:cond delay="0"/>
+                                  </p:stCondLst>
+                                  <p:childTnLst>
+                                    <p:set>
+                                      <p:cBhvr>
+                                        <p:cTn id="10" dur="1" fill="hold">
+                                          <p:stCondLst>
+                                            <p:cond delay="0"/>
+                                          </p:stCondLst>
+                                        </p:cTn>
+                                        <p:tgtEl>
+                                          <p:spTgt spid="3">
+                                            <p:txEl>
+                                              <p:pRg st="1" end="1"/>
+                                            </p:txEl>
+                                          </p:spTgt>
+                                        </p:tgtEl>
+                                        <p:attrNameLst>
+                                          <p:attrName>style.visibility</p:attrName>
+                                        </p:attrNameLst>
+                                      </p:cBhvr>
+                                      <p:to>
+                                        <p:strVal val="visible"/>
+                                      </p:to>
+                                    </p:set>
+                                  </p:childTnLst>
+                                </p:cTn>
+                              </p:par>
+                            </p:childTnLst>
+                          </p:cTn>
+                        </p:par>
+                      </p:childTnLst>
+                    </p:cTn>
+                  </p:par>
+                  <p:par>
+                    <p:cTn id="11" fill="hold">
+                      <p:stCondLst>
+                        <p:cond delay="indefinite"/>
+                      </p:stCondLst>
+                      <p:childTnLst>
+                        <p:par>
+                          <p:cTn id="12" fill="hold">
+                            <p:stCondLst>
+                              <p:cond delay="0"/>
+                            </p:stCondLst>
+                            <p:childTnLst>
+                              <p:par>
+                                <p:cTn id="13" presetID="1" presetClass="entr" presetSubtype="0" fill="hold" grpId="0" nodeType="clickEffect">
+                                  <p:stCondLst>
+                                    <p:cond delay="0"/>
+                                  </p:stCondLst>
+                                  <p:childTnLst>
+                                    <p:set>
+                                      <p:cBhvr>
+                                        <p:cTn id="14" dur="1" fill="hold">
+                                          <p:stCondLst>
+                                            <p:cond delay="0"/>
+                                          </p:stCondLst>
+                                        </p:cTn>
+                                        <p:tgtEl>
+                                          <p:spTgt spid="3">
+                                            <p:txEl>
+                                              <p:pRg st="2" end="2"/>
+                                            </p:txEl>
+                                          </p:spTgt>
+                                        </p:tgtEl>
+                                        <p:attrNameLst>
+                                          <p:attrName>style.visibility</p:attrName>
+                                        </p:attrNameLst>
+                                      </p:cBhvr>
+                                      <p:to>
+                                        <p:strVal val="visible"/>
+                                      </p:to>
+                                    </p:set>
+                                  </p:childTnLst>
+                                </p:cTn>
+                              </p:par>
+                            </p:childTnLst>
+                          </p:cTn>
+                        </p:par>
+                      </p:childTnLst>
+                    </p:cTn>
+                  </p:par>
+                  <p:par>
+                    <p:cTn id="15" fill="hold">
+                      <p:stCondLst>
+                        <p:cond delay="indefinite"/>
+                      </p:stCondLst>
+                      <p:childTnLst>
+                        <p:par>
+                          <p:cTn id="16" fill="hold">
+                            <p:stCondLst>
+                              <p:cond delay="0"/>
+                            </p:stCondLst>
+                            <p:childTnLst>
+                              <p:par>
+                                <p:cTn id="17" presetID="1" presetClass="entr" presetSubtype="0" fill="hold" grpId="0" nodeType="clickEffect">
+                                  <p:stCondLst>
+                                    <p:cond delay="0"/>
+                                  </p:stCondLst>
+                                  <p:childTnLst>
+                                    <p:set>
+                                      <p:cBhvr>
+                                        <p:cTn id="18" dur="1" fill="hold">
+                                          <p:stCondLst>
+                                            <p:cond delay="0"/>
+                                          </p:stCondLst>
+                                        </p:cTn>
+                                        <p:tgtEl>
+                                          <p:spTgt spid="3">
+                                            <p:txEl>
+                                              <p:pRg st="3" end="3"/>
+                                            </p:txEl>
+                                          </p:spTgt>
+                                        </p:tgtEl>
+                                        <p:attrNameLst>
+                                          <p:attrName>style.visibility</p:attrName>
+                                        </p:attrNameLst>
+                                      </p:cBhvr>
+                                      <p:to>
+                                        <p:strVal val="visible"/>
+                                      </p:to>
+                                    </p:set>
+                                  </p:childTnLst>
+                                </p:cTn>
+                              </p:par>
+                            </p:childTnLst>
+                          </p:cTn>
+                        </p:par>
+                      </p:childTnLst>
+                    </p:cTn>
+                  </p:par>
+                  <p:par>
+                    <p:cTn id="19" fill="hold">
+                      <p:stCondLst>
+                        <p:cond delay="indefinite"/>
+                      </p:stCondLst>
+                      <p:childTnLst>
+                        <p:par>
+                          <p:cTn id="20" fill="hold">
+                            <p:stCondLst>
+                              <p:cond delay="0"/>
+                            </p:stCondLst>
+                            <p:childTnLst>
+                              <p:par>
+                                <p:cTn id="21" presetID="1" presetClass="entr" presetSubtype="0" fill="hold" grpId="0" nodeType="clickEffect">
+                                  <p:stCondLst>
+                                    <p:cond delay="0"/>
+                                  </p:stCondLst>
+                                  <p:childTnLst>
+                                    <p:set>
+                                      <p:cBhvr>
+                                        <p:cTn id="22" dur="1" fill="hold">
+                                          <p:stCondLst>
+                                            <p:cond delay="0"/>
+                                          </p:stCondLst>
+                                        </p:cTn>
+                                        <p:tgtEl>
+                                          <p:spTgt spid="3">
+                                            <p:txEl>
+                                              <p:pRg st="4" end="4"/>
+                                            </p:txEl>
+                                          </p:spTgt>
+                                        </p:tgtEl>
+                                        <p:attrNameLst>
+                                          <p:attrName>style.visibility</p:attrName>
+                                        </p:attrNameLst>
+                                      </p:cBhvr>
+                                      <p:to>
+                                        <p:strVal val="visible"/>
+                                      </p:to>
+                                    </p:set>
+                                  </p:childTnLst>
+                                </p:cTn>
+                              </p:par>
+                            </p:childTnLst>
+                          </p:cTn>
+                        </p:par>
+                      </p:childTnLst>
+                    </p:cTn>
+                  </p:par>
+                </p:childTnLst>
+              </p:cTn>
+              <p:prevCondLst>
+                <p:cond evt="onPrev" delay="0">
+                  <p:tgtEl>
+                    <p:sldTgt/>
+                  </p:tgtEl>
+                </p:cond>
+              </p:prevCondLst>
+              <p:nextCondLst>
+                <p:cond evt="onNext" delay="0">
+                  <p:tgtEl>
+                    <p:sldTgt/>
+                  </p:tgtEl>
+                </p:cond>
+              </p:nextCondLst>
+            </p:seq>
+          </p:childTnLst>
+        </p:cTn>
+      </p:par>
+    </p:tnLst>
+    <p:bldLst>
+      <p:bldP spid="3" grpId="0" uiExpand="1" build="p">
+        <p:tmplLst>
+          <p:tmpl lvl="1">
+            <p:tnLst>
+              <p:par>
+                <p:cTn presetID="1" presetClass="entr" presetSubtype="0" fill="hold" nodeType="clickEffect">
+                  <p:stCondLst>
+                    <p:cond delay="0"/>
+                  </p:stCondLst>
+                  <p:childTnLst>
+                    <p:set>
+                      <p:cBhvr>
+                        <p:cTn dur="1" fill="hold">
+                          <p:stCondLst>
+                            <p:cond delay="0"/>
+                          </p:stCondLst>
+                        </p:cTn>
+                        <p:tgtEl>
+                          <p:spTgt spid="3"/>
+                        </p:tgtEl>
+                        <p:attrNameLst>
+                          <p:attrName>style.visibility</p:attrName>
+                        </p:attrNameLst>
+                      </p:cBhvr>
+                      <p:to>
+                        <p:strVal val="visible"/>
+                      </p:to>
+                    </p:set>
+                  </p:childTnLst>
+                </p:cTn>
+              </p:par>
+            </p:tnLst>
+          </p:tmpl>
+          <p:tmpl lvl="2">
+            <p:tnLst>
+              <p:par>
+                <p:cTn presetID="1" presetClass="entr" presetSubtype="0" fill="hold" nodeType="clickEffect">
+                  <p:stCondLst>
+                    <p:cond delay="0"/>
+                  </p:stCondLst>
+                  <p:childTnLst>
+                    <p:set>
+                      <p:cBhvr>
+                        <p:cTn dur="1" fill="hold">
+                          <p:stCondLst>
+                            <p:cond delay="0"/>
+                          </p:stCondLst>
+                        </p:cTn>
+                        <p:tgtEl>
+                          <p:spTgt spid="3"/>
+                        </p:tgtEl>
+                        <p:attrNameLst>
+                          <p:attrName>style.visibility</p:attrName>
+                        </p:attrNameLst>
+                      </p:cBhvr>
+                      <p:to>
+                        <p:strVal val="visible"/>
+                      </p:to>
+                    </p:set>
+                  </p:childTnLst>
+                </p:cTn>
+              </p:par>
+            </p:tnLst>
+          </p:tmpl>
+          <p:tmpl lvl="3">
+            <p:tnLst>
+              <p:par>
+                <p:cTn presetID="1" presetClass="entr" presetSubtype="0" fill="hold" nodeType="clickEffect">
+                  <p:stCondLst>
+                    <p:cond delay="0"/>
+                  </p:stCondLst>
+                  <p:childTnLst>
+                    <p:set>
+                      <p:cBhvr>
+                        <p:cTn dur="1" fill="hold">
+                          <p:stCondLst>
+                            <p:cond delay="0"/>
+                          </p:stCondLst>
+                        </p:cTn>
+                        <p:tgtEl>
+                          <p:spTgt spid="3"/>
+                        </p:tgtEl>
+                        <p:attrNameLst>
+                          <p:attrName>style.visibility</p:attrName>
+                        </p:attrNameLst>
+                      </p:cBhvr>
+                      <p:to>
+                        <p:strVal val="visible"/>
+                      </p:to>
+                    </p:set>
+                  </p:childTnLst>
+                </p:cTn>
+              </p:par>
+            </p:tnLst>
+          </p:tmpl>
+          <p:tmpl lvl="4">
+            <p:tnLst>
+              <p:par>
+                <p:cTn presetID="1" presetClass="entr" presetSubtype="0" fill="hold" nodeType="clickEffect">
+                  <p:stCondLst>
+                    <p:cond delay="0"/>
+                  </p:stCondLst>
+                  <p:childTnLst>
+                    <p:set>
+                      <p:cBhvr>
+                        <p:cTn dur="1" fill="hold">
+                          <p:stCondLst>
+                            <p:cond delay="0"/>
+                          </p:stCondLst>
+                        </p:cTn>
+                        <p:tgtEl>
+                          <p:spTgt spid="3"/>
+                        </p:tgtEl>
+                        <p:attrNameLst>
+                          <p:attrName>style.visibility</p:attrName>
+                        </p:attrNameLst>
+                      </p:cBhvr>
+                      <p:to>
+                        <p:strVal val="visible"/>
+                      </p:to>
+                    </p:set>
+                  </p:childTnLst>
+                </p:cTn>
+              </p:par>
+            </p:tnLst>
+          </p:tmpl>
+          <p:tmpl lvl="5">
+            <p:tnLst>
+              <p:par>
+                <p:cTn presetID="1" presetClass="entr" presetSubtype="0" fill="hold" nodeType="clickEffect">
+                  <p:stCondLst>
+                    <p:cond delay="0"/>
+                  </p:stCondLst>
+                  <p:childTnLst>
+                    <p:set>
+                      <p:cBhvr>
+                        <p:cTn dur="1" fill="hold">
+                          <p:stCondLst>
+                            <p:cond delay="0"/>
+                          </p:stCondLst>
+                        </p:cTn>
+                        <p:tgtEl>
+                          <p:spTgt spid="3"/>
+                        </p:tgtEl>
+                        <p:attrNameLst>
+                          <p:attrName>style.visibility</p:attrName>
+                        </p:attrNameLst>
+                      </p:cBhvr>
+                      <p:to>
+                        <p:strVal val="visible"/>
+                      </p:to>
+                    </p:set>
+                  </p:childTnLst>
+                </p:cTn>
+              </p:par>
+            </p:tnLst>
+          </p:tmpl>
+        </p:tmplLst>
+      </p:bldP>
+    </p:bldLst>
+  </p:timing>
   <p:txStyles>
     <p:titleStyle>
       <a:lvl1pPr algn="l" defTabSz="914400" rtl="0" eaLnBrk="1" latinLnBrk="0" hangingPunct="1">
@@ -4057,33 +4498,61 @@
             </a:r>
             <a:r>
               <a:rPr lang="en-US" dirty="0" err="1"/>
+              <a:t>p</a:t>
+            </a:r>
+            <a:r>
+              <a:rPr lang="en-US" dirty="0" err="1">
+                <a:highlight>
+                  <a:srgbClr val="FFFF00"/>
+                </a:highlight>
+              </a:rPr>
+              <a:t>age.locator</a:t>
+            </a:r>
+            <a:r>
+              <a:rPr lang="en-US" dirty="0">
+                <a:highlight>
+                  <a:srgbClr val="FFFF00"/>
+                </a:highlight>
+              </a:rPr>
+              <a:t>(selector)</a:t>
+            </a:r>
+          </a:p>
+          <a:p>
+            <a:pPr lvl="2"/>
+            <a:r>
+              <a:rPr lang="en-US" dirty="0"/>
+              <a:t>Example: </a:t>
+            </a:r>
+            <a:r>
+              <a:rPr lang="en-US" dirty="0" err="1">
+                <a:highlight>
+                  <a:srgbClr val="FFFF00"/>
+                </a:highlight>
+              </a:rPr>
               <a:t>page.locator</a:t>
             </a:r>
             <a:r>
-              <a:rPr lang="en-US" dirty="0"/>
-              <a:t>(selector)</a:t>
-            </a:r>
-          </a:p>
-          <a:p>
-            <a:pPr lvl="2"/>
-            <a:r>
-              <a:rPr lang="en-US" dirty="0"/>
-              <a:t>Example: </a:t>
-            </a:r>
-            <a:r>
-              <a:rPr lang="en-US" dirty="0" err="1"/>
-              <a:t>page.locator</a:t>
-            </a:r>
-            <a:r>
-              <a:rPr lang="en-US" dirty="0"/>
+              <a:rPr lang="en-US" dirty="0">
+                <a:highlight>
+                  <a:srgbClr val="FFFF00"/>
+                </a:highlight>
+              </a:rPr>
               <a:t>('</a:t>
             </a:r>
             <a:r>
-              <a:rPr lang="en-US" dirty="0" err="1"/>
+              <a:rPr lang="en-US" dirty="0" err="1">
+                <a:highlight>
+                  <a:srgbClr val="FFFF00"/>
+                </a:highlight>
+              </a:rPr>
               <a:t>button.submit</a:t>
             </a:r>
             <a:r>
-              <a:rPr lang="en-US" dirty="0"/>
+              <a:rPr lang="en-US" dirty="0">
+                <a:highlight>
+                  <a:srgbClr val="FFFF00"/>
+                </a:highlight>
+              </a:rPr>
               <a:t>')</a:t>
             </a:r>
           </a:p>
@@ -5539,28 +6008,55 @@
               <a:rPr lang="en-IN" sz="3200" dirty="0"/>
               <a:t>Syntax: </a:t>
             </a:r>
-            <a:r>
-              <a:rPr lang="en-IN" sz="3200" dirty="0" err="1"/>
+          </a:p>
+          <a:p>
+            <a:pPr lvl="2"/>
+            <a:r>
+              <a:rPr lang="en-IN" sz="3000" dirty="0" err="1">
+                <a:highlight>
+                  <a:srgbClr val="FFFF00"/>
+                </a:highlight>
+              </a:rPr>
               <a:t>page.locator</a:t>
             </a:r>
             <a:r>
-              <a:rPr lang="en-IN" sz="3200" dirty="0"/>
+              <a:rPr lang="en-IN" sz="3000" dirty="0">
+                <a:highlight>
+                  <a:srgbClr val="FFFF00"/>
+                </a:highlight>
+              </a:rPr>
               <a:t>({ </a:t>
             </a:r>
             <a:r>
-              <a:rPr lang="en-IN" sz="3200" dirty="0" err="1"/>
+              <a:rPr lang="en-IN" sz="3000" dirty="0" err="1">
+                <a:highlight>
+                  <a:srgbClr val="FFFF00"/>
+                </a:highlight>
+              </a:rPr>
               <a:t>xpath</a:t>
             </a:r>
             <a:r>
-              <a:rPr lang="en-IN" sz="3200" dirty="0"/>
+              <a:rPr lang="en-IN" sz="3000" dirty="0">
+                <a:highlight>
+                  <a:srgbClr val="FFFF00"/>
+                </a:highlight>
+              </a:rPr>
               <a:t>: '</a:t>
             </a:r>
             <a:r>
-              <a:rPr lang="en-IN" sz="3200" dirty="0" err="1"/>
+              <a:rPr lang="en-IN" sz="3000" dirty="0" err="1">
+                <a:highlight>
+                  <a:srgbClr val="FFFF00"/>
+                </a:highlight>
+              </a:rPr>
               <a:t>your_xpath_expression</a:t>
             </a:r>
             <a:r>
-              <a:rPr lang="en-IN" sz="3200" dirty="0"/>
+              <a:rPr lang="en-IN" sz="3000" dirty="0">
+                <a:highlight>
+                  <a:srgbClr val="FFFF00"/>
+                </a:highlight>
+              </a:rPr>
               <a:t>' })</a:t>
             </a:r>
           </a:p>
@@ -5570,20 +6066,39 @@
               <a:rPr lang="en-IN" sz="3200" dirty="0"/>
               <a:t>Example: </a:t>
             </a:r>
-            <a:r>
-              <a:rPr lang="en-IN" sz="3200" dirty="0" err="1"/>
+          </a:p>
+          <a:p>
+            <a:pPr lvl="2"/>
+            <a:r>
+              <a:rPr lang="en-IN" sz="3000" dirty="0" err="1">
+                <a:highlight>
+                  <a:srgbClr val="FFFF00"/>
+                </a:highlight>
+              </a:rPr>
               <a:t>page.locator</a:t>
             </a:r>
             <a:r>
-              <a:rPr lang="en-IN" sz="3200" dirty="0"/>
+              <a:rPr lang="en-IN" sz="3000" dirty="0">
+                <a:highlight>
+                  <a:srgbClr val="FFFF00"/>
+                </a:highlight>
+              </a:rPr>
               <a:t>({ </a:t>
             </a:r>
             <a:r>
-              <a:rPr lang="en-IN" sz="3200" dirty="0" err="1"/>
+              <a:rPr lang="en-IN" sz="3000" dirty="0" err="1">
+                <a:highlight>
+                  <a:srgbClr val="FFFF00"/>
+                </a:highlight>
+              </a:rPr>
               <a:t>xpath</a:t>
             </a:r>
             <a:r>
-              <a:rPr lang="en-IN" sz="3200" dirty="0"/>
+              <a:rPr lang="en-IN" sz="3000" dirty="0">
+                <a:highlight>
+                  <a:srgbClr val="FFFF00"/>
+                </a:highlight>
+              </a:rPr>
               <a:t>: '//input[@id="username"]' })</a:t>
             </a:r>
           </a:p>
@@ -6768,11 +7283,19 @@
               <a:t>Syntax: </a:t>
             </a:r>
             <a:r>
-              <a:rPr lang="en-US" sz="3200" dirty="0" err="1"/>
+              <a:rPr lang="en-US" sz="3200" dirty="0" err="1">
+                <a:highlight>
+                  <a:srgbClr val="FFFF00"/>
+                </a:highlight>
+              </a:rPr>
               <a:t>page.locator</a:t>
             </a:r>
             <a:r>
-              <a:rPr lang="en-US" sz="3200" dirty="0"/>
+              <a:rPr lang="en-US" sz="3200" dirty="0">
+                <a:highlight>
+                  <a:srgbClr val="FFFF00"/>
+                </a:highlight>
+              </a:rPr>
               <a:t>('text=Your Text')</a:t>
             </a:r>
           </a:p>
@@ -6783,14 +7306,26 @@
               <a:t>Example: </a:t>
             </a:r>
             <a:r>
-              <a:rPr lang="en-US" sz="3200" dirty="0" err="1"/>
+              <a:rPr lang="en-US" sz="3200" dirty="0" err="1">
+                <a:highlight>
+                  <a:srgbClr val="FFFF00"/>
+                </a:highlight>
+              </a:rPr>
               <a:t>page.locator</a:t>
             </a:r>
             <a:r>
-              <a:rPr lang="en-US" sz="3200" dirty="0"/>
+              <a:rPr lang="en-US" sz="3200" dirty="0">
+                <a:highlight>
+                  <a:srgbClr val="FFFF00"/>
+                </a:highlight>
+              </a:rPr>
               <a:t>('text=Submit')</a:t>
             </a:r>
-            <a:endParaRPr lang="en-IN" sz="3200" dirty="0"/>
+            <a:endParaRPr lang="en-IN" sz="3200" dirty="0">
+              <a:highlight>
+                <a:srgbClr val="FFFF00"/>
+              </a:highlight>
+            </a:endParaRPr>
           </a:p>
         </p:txBody>
       </p:sp>
@@ -8018,11 +8553,19 @@
               <a:t>Syntax: </a:t>
             </a:r>
             <a:r>
-              <a:rPr lang="en-IN" sz="2400" dirty="0" err="1"/>
+              <a:rPr lang="en-IN" sz="2400" dirty="0" err="1">
+                <a:highlight>
+                  <a:srgbClr val="FFFF00"/>
+                </a:highlight>
+              </a:rPr>
               <a:t>page.locator</a:t>
             </a:r>
             <a:r>
-              <a:rPr lang="en-IN" sz="2400" dirty="0"/>
+              <a:rPr lang="en-IN" sz="2400" dirty="0">
+                <a:highlight>
+                  <a:srgbClr val="FFFF00"/>
+                </a:highlight>
+              </a:rPr>
               <a:t>('[attribute="value"]')</a:t>
             </a:r>
           </a:p>
@@ -8033,11 +8576,19 @@
               <a:t>Example: </a:t>
             </a:r>
             <a:r>
-              <a:rPr lang="en-IN" sz="2400" dirty="0" err="1"/>
+              <a:rPr lang="en-IN" sz="2400" dirty="0" err="1">
+                <a:highlight>
+                  <a:srgbClr val="FFFF00"/>
+                </a:highlight>
+              </a:rPr>
               <a:t>page.locator</a:t>
             </a:r>
             <a:r>
-              <a:rPr lang="en-IN" sz="2400" dirty="0"/>
+              <a:rPr lang="en-IN" sz="2400" dirty="0">
+                <a:highlight>
+                  <a:srgbClr val="FFFF00"/>
+                </a:highlight>
+              </a:rPr>
               <a:t>('[name="username"]')</a:t>
             </a:r>
           </a:p>
@@ -11860,8 +12411,8 @@
         </p:blipFill>
         <p:spPr>
           <a:xfrm>
-            <a:off x="3706450" y="2016125"/>
-            <a:ext cx="5093425" cy="3449638"/>
+            <a:off x="2357044" y="1853754"/>
+            <a:ext cx="7290509" cy="4937663"/>
           </a:xfrm>
           <a:prstGeom prst="rect">
             <a:avLst/>
@@ -16763,6 +17314,296 @@
   <p:clrMapOvr>
     <a:masterClrMapping/>
   </p:clrMapOvr>
+  <mc:AlternateContent xmlns:mc="http://schemas.openxmlformats.org/markup-compatibility/2006">
+    <mc:Choice xmlns:p14="http://schemas.microsoft.com/office/powerpoint/2010/main" Requires="p14">
+      <p:transition spd="med" p14:dur="700">
+        <p:fade/>
+      </p:transition>
+    </mc:Choice>
+    <mc:Fallback>
+      <p:transition spd="med">
+        <p:fade/>
+      </p:transition>
+    </mc:Fallback>
+  </mc:AlternateContent>
+  <p:timing>
+    <p:tnLst>
+      <p:par>
+        <p:cTn id="1" dur="indefinite" restart="never" nodeType="tmRoot">
+          <p:childTnLst>
+            <p:seq concurrent="1" nextAc="seek">
+              <p:cTn id="2" dur="indefinite" nodeType="mainSeq">
+                <p:childTnLst>
+                  <p:par>
+                    <p:cTn id="3" fill="hold">
+                      <p:stCondLst>
+                        <p:cond delay="indefinite"/>
+                      </p:stCondLst>
+                      <p:childTnLst>
+                        <p:par>
+                          <p:cTn id="4" fill="hold">
+                            <p:stCondLst>
+                              <p:cond delay="0"/>
+                            </p:stCondLst>
+                            <p:childTnLst>
+                              <p:par>
+                                <p:cTn id="5" presetID="1" presetClass="entr" presetSubtype="0" fill="hold" grpId="0" nodeType="clickEffect">
+                                  <p:stCondLst>
+                                    <p:cond delay="0"/>
+                                  </p:stCondLst>
+                                  <p:childTnLst>
+                                    <p:set>
+                                      <p:cBhvr>
+                                        <p:cTn id="6" dur="1" fill="hold">
+                                          <p:stCondLst>
+                                            <p:cond delay="0"/>
+                                          </p:stCondLst>
+                                        </p:cTn>
+                                        <p:tgtEl>
+                                          <p:spTgt spid="3">
+                                            <p:txEl>
+                                              <p:pRg st="0" end="0"/>
+                                            </p:txEl>
+                                          </p:spTgt>
+                                        </p:tgtEl>
+                                        <p:attrNameLst>
+                                          <p:attrName>style.visibility</p:attrName>
+                                        </p:attrNameLst>
+                                      </p:cBhvr>
+                                      <p:to>
+                                        <p:strVal val="visible"/>
+                                      </p:to>
+                                    </p:set>
+                                  </p:childTnLst>
+                                </p:cTn>
+                              </p:par>
+                            </p:childTnLst>
+                          </p:cTn>
+                        </p:par>
+                      </p:childTnLst>
+                    </p:cTn>
+                  </p:par>
+                  <p:par>
+                    <p:cTn id="7" fill="hold">
+                      <p:stCondLst>
+                        <p:cond delay="indefinite"/>
+                      </p:stCondLst>
+                      <p:childTnLst>
+                        <p:par>
+                          <p:cTn id="8" fill="hold">
+                            <p:stCondLst>
+                              <p:cond delay="0"/>
+                            </p:stCondLst>
+                            <p:childTnLst>
+                              <p:par>
+                                <p:cTn id="9" presetID="1" presetClass="entr" presetSubtype="0" fill="hold" grpId="0" nodeType="clickEffect">
+                                  <p:stCondLst>
+                                    <p:cond delay="0"/>
+                                  </p:stCondLst>
+                                  <p:childTnLst>
+                                    <p:set>
+                                      <p:cBhvr>
+                                        <p:cTn id="10" dur="1" fill="hold">
+                                          <p:stCondLst>
+                                            <p:cond delay="0"/>
+                                          </p:stCondLst>
+                                        </p:cTn>
+                                        <p:tgtEl>
+                                          <p:spTgt spid="3">
+                                            <p:txEl>
+                                              <p:pRg st="1" end="1"/>
+                                            </p:txEl>
+                                          </p:spTgt>
+                                        </p:tgtEl>
+                                        <p:attrNameLst>
+                                          <p:attrName>style.visibility</p:attrName>
+                                        </p:attrNameLst>
+                                      </p:cBhvr>
+                                      <p:to>
+                                        <p:strVal val="visible"/>
+                                      </p:to>
+                                    </p:set>
+                                  </p:childTnLst>
+                                </p:cTn>
+                              </p:par>
+                            </p:childTnLst>
+                          </p:cTn>
+                        </p:par>
+                      </p:childTnLst>
+                    </p:cTn>
+                  </p:par>
+                  <p:par>
+                    <p:cTn id="11" fill="hold">
+                      <p:stCondLst>
+                        <p:cond delay="indefinite"/>
+                      </p:stCondLst>
+                      <p:childTnLst>
+                        <p:par>
+                          <p:cTn id="12" fill="hold">
+                            <p:stCondLst>
+                              <p:cond delay="0"/>
+                            </p:stCondLst>
+                            <p:childTnLst>
+                              <p:par>
+                                <p:cTn id="13" presetID="1" presetClass="entr" presetSubtype="0" fill="hold" grpId="0" nodeType="clickEffect">
+                                  <p:stCondLst>
+                                    <p:cond delay="0"/>
+                                  </p:stCondLst>
+                                  <p:childTnLst>
+                                    <p:set>
+                                      <p:cBhvr>
+                                        <p:cTn id="14" dur="1" fill="hold">
+                                          <p:stCondLst>
+                                            <p:cond delay="0"/>
+                                          </p:stCondLst>
+                                        </p:cTn>
+                                        <p:tgtEl>
+                                          <p:spTgt spid="3">
+                                            <p:txEl>
+                                              <p:pRg st="2" end="2"/>
+                                            </p:txEl>
+                                          </p:spTgt>
+                                        </p:tgtEl>
+                                        <p:attrNameLst>
+                                          <p:attrName>style.visibility</p:attrName>
+                                        </p:attrNameLst>
+                                      </p:cBhvr>
+                                      <p:to>
+                                        <p:strVal val="visible"/>
+                                      </p:to>
+                                    </p:set>
+                                  </p:childTnLst>
+                                </p:cTn>
+                              </p:par>
+                            </p:childTnLst>
+                          </p:cTn>
+                        </p:par>
+                      </p:childTnLst>
+                    </p:cTn>
+                  </p:par>
+                  <p:par>
+                    <p:cTn id="15" fill="hold">
+                      <p:stCondLst>
+                        <p:cond delay="indefinite"/>
+                      </p:stCondLst>
+                      <p:childTnLst>
+                        <p:par>
+                          <p:cTn id="16" fill="hold">
+                            <p:stCondLst>
+                              <p:cond delay="0"/>
+                            </p:stCondLst>
+                            <p:childTnLst>
+                              <p:par>
+                                <p:cTn id="17" presetID="1" presetClass="entr" presetSubtype="0" fill="hold" grpId="0" nodeType="clickEffect">
+                                  <p:stCondLst>
+                                    <p:cond delay="0"/>
+                                  </p:stCondLst>
+                                  <p:childTnLst>
+                                    <p:set>
+                                      <p:cBhvr>
+                                        <p:cTn id="18" dur="1" fill="hold">
+                                          <p:stCondLst>
+                                            <p:cond delay="0"/>
+                                          </p:stCondLst>
+                                        </p:cTn>
+                                        <p:tgtEl>
+                                          <p:spTgt spid="3">
+                                            <p:txEl>
+                                              <p:pRg st="3" end="3"/>
+                                            </p:txEl>
+                                          </p:spTgt>
+                                        </p:tgtEl>
+                                        <p:attrNameLst>
+                                          <p:attrName>style.visibility</p:attrName>
+                                        </p:attrNameLst>
+                                      </p:cBhvr>
+                                      <p:to>
+                                        <p:strVal val="visible"/>
+                                      </p:to>
+                                    </p:set>
+                                  </p:childTnLst>
+                                </p:cTn>
+                              </p:par>
+                            </p:childTnLst>
+                          </p:cTn>
+                        </p:par>
+                      </p:childTnLst>
+                    </p:cTn>
+                  </p:par>
+                  <p:par>
+                    <p:cTn id="19" fill="hold">
+                      <p:stCondLst>
+                        <p:cond delay="indefinite"/>
+                      </p:stCondLst>
+                      <p:childTnLst>
+                        <p:par>
+                          <p:cTn id="20" fill="hold">
+                            <p:stCondLst>
+                              <p:cond delay="0"/>
+                            </p:stCondLst>
+                            <p:childTnLst>
+                              <p:par>
+                                <p:cTn id="21" presetID="1" presetClass="entr" presetSubtype="0" fill="hold" grpId="0" nodeType="clickEffect">
+                                  <p:stCondLst>
+                                    <p:cond delay="0"/>
+                                  </p:stCondLst>
+                                  <p:childTnLst>
+                                    <p:set>
+                                      <p:cBhvr>
+                                        <p:cTn id="22" dur="1" fill="hold">
+                                          <p:stCondLst>
+                                            <p:cond delay="0"/>
+                                          </p:stCondLst>
+                                        </p:cTn>
+                                        <p:tgtEl>
+                                          <p:spTgt spid="3">
+                                            <p:txEl>
+                                              <p:pRg st="4" end="4"/>
+                                            </p:txEl>
+                                          </p:spTgt>
+                                        </p:tgtEl>
+                                        <p:attrNameLst>
+                                          <p:attrName>style.visibility</p:attrName>
+                                        </p:attrNameLst>
+                                      </p:cBhvr>
+                                      <p:to>
+                                        <p:strVal val="visible"/>
+                                      </p:to>
+                                    </p:set>
+                                  </p:childTnLst>
+                                </p:cTn>
+                              </p:par>
+                            </p:childTnLst>
+                          </p:cTn>
+                        </p:par>
+                      </p:childTnLst>
+                    </p:cTn>
+                  </p:par>
+                </p:childTnLst>
+              </p:cTn>
+              <p:prevCondLst>
+                <p:cond evt="onPrev" delay="0">
+                  <p:tgtEl>
+                    <p:sldTgt/>
+                  </p:tgtEl>
+                </p:cond>
+              </p:prevCondLst>
+              <p:nextCondLst>
+                <p:cond evt="onNext" delay="0">
+                  <p:tgtEl>
+                    <p:sldTgt/>
+                  </p:tgtEl>
+                </p:cond>
+              </p:nextCondLst>
+            </p:seq>
+          </p:childTnLst>
+        </p:cTn>
+      </p:par>
+    </p:tnLst>
+    <p:bldLst>
+      <p:bldP spid="3" grpId="0" build="p"/>
+    </p:bldLst>
+  </p:timing>
 </p:sld>
 </file>
 
@@ -22039,6 +22880,28 @@
             </a:r>
           </a:p>
           <a:p>
+            <a:pPr marL="457200" lvl="1" indent="0" eaLnBrk="0" fontAlgn="base" hangingPunct="0">
+              <a:lnSpc>
+                <a:spcPct val="100000"/>
+              </a:lnSpc>
+              <a:spcBef>
+                <a:spcPct val="0"/>
+              </a:spcBef>
+              <a:spcAft>
+                <a:spcPct val="0"/>
+              </a:spcAft>
+              <a:buClrTx/>
+              <a:buSzTx/>
+              <a:buNone/>
+            </a:pPr>
+            <a:endParaRPr lang="en-US" altLang="en-US" sz="2400" dirty="0">
+              <a:solidFill>
+                <a:srgbClr val="0D0D0D"/>
+              </a:solidFill>
+              <a:latin typeface="Söhne"/>
+            </a:endParaRPr>
+          </a:p>
+          <a:p>
             <a:pPr marL="0" lvl="0" indent="0" eaLnBrk="0" fontAlgn="base" hangingPunct="0">
               <a:lnSpc>
                 <a:spcPct val="100000"/>
@@ -22060,19 +22923,19 @@
               <a:t>6. </a:t>
             </a:r>
             <a:r>
-              <a:rPr lang="en-IN" sz="2400" dirty="0" err="1"/>
+              <a:rPr lang="en-IN" sz="2400" b="1" dirty="0" err="1"/>
               <a:t>npx</a:t>
             </a:r>
             <a:r>
-              <a:rPr lang="en-IN" sz="2400" dirty="0"/>
+              <a:rPr lang="en-IN" sz="2400" b="1" dirty="0"/>
               <a:t> playwright test –</a:t>
             </a:r>
             <a:r>
-              <a:rPr lang="en-IN" sz="2400" dirty="0" err="1"/>
+              <a:rPr lang="en-IN" sz="2400" b="1" dirty="0" err="1"/>
               <a:t>ui</a:t>
             </a:r>
             <a:r>
-              <a:rPr lang="en-IN" sz="2400" dirty="0"/>
+              <a:rPr lang="en-IN" sz="2400" b="1" dirty="0"/>
               <a:t> </a:t>
             </a:r>
           </a:p>
@@ -25681,23 +26544,39 @@
               <a:buNone/>
             </a:pPr>
             <a:r>
-              <a:rPr lang="en-IN" sz="1800" dirty="0" err="1"/>
+              <a:rPr lang="en-IN" sz="1800" dirty="0" err="1">
+                <a:highlight>
+                  <a:srgbClr val="FFFF00"/>
+                </a:highlight>
+              </a:rPr>
               <a:t>const</a:t>
             </a:r>
             <a:r>
-              <a:rPr lang="en-IN" sz="1800" dirty="0"/>
+              <a:rPr lang="en-IN" sz="1800" dirty="0">
+                <a:highlight>
+                  <a:srgbClr val="FFFF00"/>
+                </a:highlight>
+              </a:rPr>
               <a:t> { test, expect } = require('@playwright/test');</a:t>
             </a:r>
           </a:p>
           <a:p>
-            <a:endParaRPr lang="en-IN" sz="1800" dirty="0"/>
+            <a:endParaRPr lang="en-IN" sz="1800" dirty="0">
+              <a:highlight>
+                <a:srgbClr val="FFFF00"/>
+              </a:highlight>
+            </a:endParaRPr>
           </a:p>
           <a:p>
             <a:pPr marL="0" indent="0">
               <a:buNone/>
             </a:pPr>
             <a:r>
-              <a:rPr lang="en-IN" sz="1800" dirty="0"/>
+              <a:rPr lang="en-IN" sz="1800" dirty="0">
+                <a:highlight>
+                  <a:srgbClr val="FFFF00"/>
+                </a:highlight>
+              </a:rPr>
               <a:t>test('My First Test', async ({ page }) =&gt; {</a:t>
             </a:r>
           </a:p>
@@ -25706,15 +26585,27 @@
               <a:buNone/>
             </a:pPr>
             <a:r>
-              <a:rPr lang="en-IN" dirty="0"/>
+              <a:rPr lang="en-IN" dirty="0">
+                <a:highlight>
+                  <a:srgbClr val="FFFF00"/>
+                </a:highlight>
+              </a:rPr>
               <a:t>await </a:t>
             </a:r>
             <a:r>
-              <a:rPr lang="en-IN" dirty="0" err="1"/>
+              <a:rPr lang="en-IN" dirty="0" err="1">
+                <a:highlight>
+                  <a:srgbClr val="FFFF00"/>
+                </a:highlight>
+              </a:rPr>
               <a:t>page.goto</a:t>
             </a:r>
             <a:r>
-              <a:rPr lang="en-IN" dirty="0"/>
+              <a:rPr lang="en-IN" dirty="0">
+                <a:highlight>
+                  <a:srgbClr val="FFFF00"/>
+                </a:highlight>
+              </a:rPr>
               <a:t>('https://example.com');</a:t>
             </a:r>
           </a:p>
@@ -25723,23 +26614,43 @@
               <a:buNone/>
             </a:pPr>
             <a:r>
-              <a:rPr lang="en-IN" dirty="0"/>
+              <a:rPr lang="en-IN" dirty="0">
+                <a:highlight>
+                  <a:srgbClr val="FFFF00"/>
+                </a:highlight>
+              </a:rPr>
               <a:t>expect(await </a:t>
             </a:r>
             <a:r>
-              <a:rPr lang="en-IN" dirty="0" err="1"/>
+              <a:rPr lang="en-IN" dirty="0" err="1">
+                <a:highlight>
+                  <a:srgbClr val="FFFF00"/>
+                </a:highlight>
+              </a:rPr>
               <a:t>page.title</a:t>
             </a:r>
             <a:r>
-              <a:rPr lang="en-IN" dirty="0"/>
+              <a:rPr lang="en-IN" dirty="0">
+                <a:highlight>
+                  <a:srgbClr val="FFFF00"/>
+                </a:highlight>
+              </a:rPr>
               <a:t>()).</a:t>
             </a:r>
             <a:r>
-              <a:rPr lang="en-IN" dirty="0" err="1"/>
+              <a:rPr lang="en-IN" dirty="0" err="1">
+                <a:highlight>
+                  <a:srgbClr val="FFFF00"/>
+                </a:highlight>
+              </a:rPr>
               <a:t>toBe</a:t>
             </a:r>
             <a:r>
-              <a:rPr lang="en-IN" dirty="0"/>
+              <a:rPr lang="en-IN" dirty="0">
+                <a:highlight>
+                  <a:srgbClr val="FFFF00"/>
+                </a:highlight>
+              </a:rPr>
               <a:t>('Example Domain');</a:t>
             </a:r>
           </a:p>
@@ -25748,7 +26659,11 @@
               <a:buNone/>
             </a:pPr>
             <a:r>
-              <a:rPr lang="en-IN" sz="1800" dirty="0"/>
+              <a:rPr lang="en-IN" sz="1800" dirty="0">
+                <a:highlight>
+                  <a:srgbClr val="FFFF00"/>
+                </a:highlight>
+              </a:rPr>
               <a:t>});</a:t>
             </a:r>
           </a:p>
@@ -26496,8 +27411,12 @@
           </a:p>
           <a:p>
             <a:r>
-              <a:rPr lang="en-US" dirty="0"/>
-              <a:t>Imports: Import necessary functions and objects from Playwright or other libraries.</a:t>
+              <a:rPr lang="en-US" b="1" dirty="0"/>
+              <a:t>Imports</a:t>
+            </a:r>
+            <a:r>
+              <a:rPr lang="en-US" dirty="0"/>
+              <a:t>: Import necessary functions and objects from Playwright or other libraries.</a:t>
             </a:r>
           </a:p>
           <a:p>
@@ -26650,6 +27569,178 @@
   <p:clrMapOvr>
     <a:masterClrMapping/>
   </p:clrMapOvr>
+  <p:timing>
+    <p:tnLst>
+      <p:par>
+        <p:cTn id="1" dur="indefinite" restart="never" nodeType="tmRoot">
+          <p:childTnLst>
+            <p:seq concurrent="1" nextAc="seek">
+              <p:cTn id="2" dur="indefinite" nodeType="mainSeq">
+                <p:childTnLst>
+                  <p:par>
+                    <p:cTn id="3" fill="hold">
+                      <p:stCondLst>
+                        <p:cond delay="indefinite"/>
+                      </p:stCondLst>
+                      <p:childTnLst>
+                        <p:par>
+                          <p:cTn id="4" fill="hold">
+                            <p:stCondLst>
+                              <p:cond delay="0"/>
+                            </p:stCondLst>
+                            <p:childTnLst>
+                              <p:par>
+                                <p:cTn id="5" presetID="1" presetClass="entr" presetSubtype="0" fill="hold" nodeType="clickEffect">
+                                  <p:stCondLst>
+                                    <p:cond delay="0"/>
+                                  </p:stCondLst>
+                                  <p:childTnLst>
+                                    <p:set>
+                                      <p:cBhvr>
+                                        <p:cTn id="6" dur="1" fill="hold">
+                                          <p:stCondLst>
+                                            <p:cond delay="0"/>
+                                          </p:stCondLst>
+                                        </p:cTn>
+                                        <p:tgtEl>
+                                          <p:spTgt spid="3">
+                                            <p:txEl>
+                                              <p:pRg st="0" end="0"/>
+                                            </p:txEl>
+                                          </p:spTgt>
+                                        </p:tgtEl>
+                                        <p:attrNameLst>
+                                          <p:attrName>style.visibility</p:attrName>
+                                        </p:attrNameLst>
+                                      </p:cBhvr>
+                                      <p:to>
+                                        <p:strVal val="visible"/>
+                                      </p:to>
+                                    </p:set>
+                                  </p:childTnLst>
+                                </p:cTn>
+                              </p:par>
+                              <p:par>
+                                <p:cTn id="7" presetID="1" presetClass="entr" presetSubtype="0" fill="hold" nodeType="withEffect">
+                                  <p:stCondLst>
+                                    <p:cond delay="0"/>
+                                  </p:stCondLst>
+                                  <p:childTnLst>
+                                    <p:set>
+                                      <p:cBhvr>
+                                        <p:cTn id="8" dur="1" fill="hold">
+                                          <p:stCondLst>
+                                            <p:cond delay="0"/>
+                                          </p:stCondLst>
+                                        </p:cTn>
+                                        <p:tgtEl>
+                                          <p:spTgt spid="3">
+                                            <p:txEl>
+                                              <p:pRg st="1" end="1"/>
+                                            </p:txEl>
+                                          </p:spTgt>
+                                        </p:tgtEl>
+                                        <p:attrNameLst>
+                                          <p:attrName>style.visibility</p:attrName>
+                                        </p:attrNameLst>
+                                      </p:cBhvr>
+                                      <p:to>
+                                        <p:strVal val="visible"/>
+                                      </p:to>
+                                    </p:set>
+                                  </p:childTnLst>
+                                </p:cTn>
+                              </p:par>
+                              <p:par>
+                                <p:cTn id="9" presetID="1" presetClass="entr" presetSubtype="0" fill="hold" nodeType="withEffect">
+                                  <p:stCondLst>
+                                    <p:cond delay="0"/>
+                                  </p:stCondLst>
+                                  <p:childTnLst>
+                                    <p:set>
+                                      <p:cBhvr>
+                                        <p:cTn id="10" dur="1" fill="hold">
+                                          <p:stCondLst>
+                                            <p:cond delay="0"/>
+                                          </p:stCondLst>
+                                        </p:cTn>
+                                        <p:tgtEl>
+                                          <p:spTgt spid="3">
+                                            <p:txEl>
+                                              <p:pRg st="2" end="2"/>
+                                            </p:txEl>
+                                          </p:spTgt>
+                                        </p:tgtEl>
+                                        <p:attrNameLst>
+                                          <p:attrName>style.visibility</p:attrName>
+                                        </p:attrNameLst>
+                                      </p:cBhvr>
+                                      <p:to>
+                                        <p:strVal val="visible"/>
+                                      </p:to>
+                                    </p:set>
+                                  </p:childTnLst>
+                                </p:cTn>
+                              </p:par>
+                              <p:par>
+                                <p:cTn id="11" presetID="1" presetClass="entr" presetSubtype="0" fill="hold" nodeType="withEffect">
+                                  <p:stCondLst>
+                                    <p:cond delay="0"/>
+                                  </p:stCondLst>
+                                  <p:childTnLst>
+                                    <p:set>
+                                      <p:cBhvr>
+                                        <p:cTn id="12" dur="1" fill="hold">
+                                          <p:stCondLst>
+                                            <p:cond delay="0"/>
+                                          </p:stCondLst>
+                                        </p:cTn>
+                                        <p:tgtEl>
+                                          <p:spTgt spid="3">
+                                            <p:txEl>
+                                              <p:pRg st="3" end="3"/>
+                                            </p:txEl>
+                                          </p:spTgt>
+                                        </p:tgtEl>
+                                        <p:attrNameLst>
+                                          <p:attrName>style.visibility</p:attrName>
+                                        </p:attrNameLst>
+                                      </p:cBhvr>
+                                      <p:to>
+                                        <p:strVal val="visible"/>
+                                      </p:to>
+                                    </p:set>
+                                  </p:childTnLst>
+                                </p:cTn>
+                              </p:par>
+                            </p:childTnLst>
+                          </p:cTn>
+                        </p:par>
+                      </p:childTnLst>
+                    </p:cTn>
+                  </p:par>
+                </p:childTnLst>
+              </p:cTn>
+              <p:prevCondLst>
+                <p:cond evt="onPrev" delay="0">
+                  <p:tgtEl>
+                    <p:sldTgt/>
+                  </p:tgtEl>
+                </p:cond>
+              </p:prevCondLst>
+              <p:nextCondLst>
+                <p:cond evt="onNext" delay="0">
+                  <p:tgtEl>
+                    <p:sldTgt/>
+                  </p:tgtEl>
+                </p:cond>
+              </p:nextCondLst>
+            </p:seq>
+          </p:childTnLst>
+        </p:cTn>
+      </p:par>
+    </p:tnLst>
+  </p:timing>
 </p:sld>
 </file>
 
@@ -26729,6 +27820,9 @@
             <a:endParaRPr lang="en-US" dirty="0"/>
           </a:p>
           <a:p>
+            <a:pPr marL="0" indent="0">
+              <a:buNone/>
+            </a:pPr>
             <a:r>
               <a:rPr lang="en-US" dirty="0">
                 <a:highlight>
@@ -26739,6 +27833,9 @@
             </a:r>
           </a:p>
           <a:p>
+            <a:pPr marL="0" indent="0">
+              <a:buNone/>
+            </a:pPr>
             <a:r>
               <a:rPr lang="en-US" dirty="0">
                 <a:highlight>
@@ -26749,6 +27846,9 @@
             </a:r>
           </a:p>
           <a:p>
+            <a:pPr marL="0" indent="0">
+              <a:buNone/>
+            </a:pPr>
             <a:r>
               <a:rPr lang="en-US" dirty="0">
                 <a:highlight>
@@ -26853,6 +27953,9 @@
             </a:r>
           </a:p>
           <a:p>
+            <a:pPr marL="0" indent="0">
+              <a:buNone/>
+            </a:pPr>
             <a:r>
               <a:rPr lang="en-US" dirty="0">
                 <a:highlight>
@@ -26863,6 +27966,9 @@
             </a:r>
           </a:p>
           <a:p>
+            <a:pPr marL="0" indent="0">
+              <a:buNone/>
+            </a:pPr>
             <a:r>
               <a:rPr lang="en-US" dirty="0">
                 <a:highlight>
@@ -26889,6 +27995,9 @@
             </a:r>
           </a:p>
           <a:p>
+            <a:pPr marL="0" indent="0">
+              <a:buNone/>
+            </a:pPr>
             <a:r>
               <a:rPr lang="en-US" dirty="0">
                 <a:highlight>
@@ -26899,6 +28008,9 @@
             </a:r>
           </a:p>
           <a:p>
+            <a:pPr marL="0" indent="0">
+              <a:buNone/>
+            </a:pPr>
             <a:r>
               <a:rPr lang="en-US" dirty="0">
                 <a:highlight>
@@ -26909,6 +28021,9 @@
             </a:r>
           </a:p>
           <a:p>
+            <a:pPr marL="0" indent="0">
+              <a:buNone/>
+            </a:pPr>
             <a:r>
               <a:rPr lang="en-US" dirty="0">
                 <a:highlight>
@@ -26971,7 +28086,12 @@
             <p:ph type="title"/>
           </p:nvPr>
         </p:nvSpPr>
-        <p:spPr/>
+        <p:spPr>
+          <a:xfrm>
+            <a:off x="1451579" y="867037"/>
+            <a:ext cx="9603275" cy="1049235"/>
+          </a:xfrm>
+        </p:spPr>
         <p:txBody>
           <a:bodyPr/>
           <a:lstStyle/>
@@ -27016,6 +28136,9 @@
             <a:endParaRPr lang="en-US" dirty="0"/>
           </a:p>
           <a:p>
+            <a:pPr marL="0" indent="0">
+              <a:buNone/>
+            </a:pPr>
             <a:r>
               <a:rPr lang="en-US" dirty="0">
                 <a:highlight>
@@ -27026,6 +28149,9 @@
             </a:r>
           </a:p>
           <a:p>
+            <a:pPr marL="0" indent="0">
+              <a:buNone/>
+            </a:pPr>
             <a:r>
               <a:rPr lang="en-US" dirty="0">
                 <a:highlight>
@@ -27052,6 +28178,9 @@
             </a:r>
           </a:p>
           <a:p>
+            <a:pPr marL="0" indent="0">
+              <a:buNone/>
+            </a:pPr>
             <a:r>
               <a:rPr lang="en-US" dirty="0">
                 <a:highlight>
@@ -27094,6 +28223,9 @@
             </a:r>
           </a:p>
           <a:p>
+            <a:pPr marL="0" indent="0">
+              <a:buNone/>
+            </a:pPr>
             <a:r>
               <a:rPr lang="en-US" dirty="0">
                 <a:highlight>
@@ -27136,6 +28268,9 @@
             </a:r>
           </a:p>
           <a:p>
+            <a:pPr marL="0" indent="0">
+              <a:buNone/>
+            </a:pPr>
             <a:r>
               <a:rPr lang="en-US" dirty="0">
                 <a:highlight>
@@ -27259,6 +28394,9 @@
             <a:endParaRPr lang="en-US" dirty="0"/>
           </a:p>
           <a:p>
+            <a:pPr marL="0" indent="0">
+              <a:buNone/>
+            </a:pPr>
             <a:r>
               <a:rPr lang="en-US" dirty="0" err="1">
                 <a:highlight>
@@ -27277,6 +28415,9 @@
             </a:r>
           </a:p>
           <a:p>
+            <a:pPr marL="0" indent="0">
+              <a:buNone/>
+            </a:pPr>
             <a:r>
               <a:rPr lang="en-US" dirty="0">
                 <a:highlight>
@@ -27287,6 +28428,9 @@
             </a:r>
           </a:p>
           <a:p>
+            <a:pPr marL="0" indent="0">
+              <a:buNone/>
+            </a:pPr>
             <a:r>
               <a:rPr lang="en-US" dirty="0">
                 <a:highlight>
@@ -27297,6 +28441,9 @@
             </a:r>
           </a:p>
           <a:p>
+            <a:pPr marL="0" indent="0">
+              <a:buNone/>
+            </a:pPr>
             <a:r>
               <a:rPr lang="en-US" dirty="0" err="1">
                 <a:highlight>
@@ -27315,6 +28462,9 @@
             </a:r>
           </a:p>
           <a:p>
+            <a:pPr marL="0" indent="0">
+              <a:buNone/>
+            </a:pPr>
             <a:r>
               <a:rPr lang="en-US" dirty="0">
                 <a:highlight>
@@ -27325,6 +28475,9 @@
             </a:r>
           </a:p>
           <a:p>
+            <a:pPr marL="0" indent="0">
+              <a:buNone/>
+            </a:pPr>
             <a:r>
               <a:rPr lang="en-US" dirty="0">
                 <a:highlight>
@@ -27392,7 +28545,10 @@
           <a:bodyPr/>
           <a:lstStyle/>
           <a:p>
-            <a:endParaRPr lang="en-IN"/>
+            <a:r>
+              <a:rPr lang="en-IN" dirty="0"/>
+              <a:t>Environment Configuration</a:t>
+            </a:r>
           </a:p>
         </p:txBody>
       </p:sp>
@@ -27421,7 +28577,7 @@
           <a:p>
             <a:r>
               <a:rPr lang="en-IN" dirty="0"/>
-              <a:t>Environment Configuration: You may configure the test environment, such as browser settings, viewport size, etc.</a:t>
+              <a:t> You may configure the test environment, such as browser settings, viewport size, etc.</a:t>
             </a:r>
           </a:p>
           <a:p>
@@ -27543,7 +28699,11 @@
           <a:bodyPr/>
           <a:lstStyle/>
           <a:p>
-            <a:endParaRPr lang="en-IN"/>
+            <a:r>
+              <a:rPr lang="en-US" dirty="0"/>
+              <a:t>Running Tests</a:t>
+            </a:r>
+            <a:endParaRPr lang="en-IN" dirty="0"/>
           </a:p>
         </p:txBody>
       </p:sp>
@@ -27570,7 +28730,7 @@
           <a:p>
             <a:r>
               <a:rPr lang="en-US" dirty="0"/>
-              <a:t>Running Tests: Execute the test script using the Playwright CLI or test runner.</a:t>
+              <a:t> Execute the test script using the Playwright CLI or test runner.</a:t>
             </a:r>
           </a:p>
           <a:p>
@@ -27602,8 +28762,12 @@
               <a:buNone/>
             </a:pPr>
             <a:r>
-              <a:rPr lang="en-US" dirty="0"/>
-              <a:t>Test Reporting: Review the test results and any error messages or assertions.</a:t>
+              <a:rPr lang="en-US" b="1" dirty="0"/>
+              <a:t>Test Reporting</a:t>
+            </a:r>
+            <a:r>
+              <a:rPr lang="en-US" dirty="0"/>
+              <a:t>: Review the test results and any error messages or assertions.</a:t>
             </a:r>
             <a:endParaRPr lang="en-IN" dirty="0"/>
           </a:p>
@@ -27692,6 +28856,47 @@
             <a:r>
               <a:rPr lang="en-US" dirty="0"/>
               <a:t>Most of the UI tests will start with navigating page to the URL</a:t>
+            </a:r>
+          </a:p>
+          <a:p>
+            <a:endParaRPr lang="en-US" dirty="0">
+              <a:highlight>
+                <a:srgbClr val="FFFF00"/>
+              </a:highlight>
+            </a:endParaRPr>
+          </a:p>
+          <a:p>
+            <a:r>
+              <a:rPr lang="en-US" dirty="0">
+                <a:highlight>
+                  <a:srgbClr val="FFFF00"/>
+                </a:highlight>
+              </a:rPr>
+              <a:t>a</a:t>
+            </a:r>
+            <a:r>
+              <a:rPr lang="en-IN" dirty="0">
+                <a:highlight>
+                  <a:srgbClr val="FFFF00"/>
+                </a:highlight>
+              </a:rPr>
+              <a:t>wait </a:t>
+            </a:r>
+            <a:r>
+              <a:rPr lang="en-IN" dirty="0" err="1">
+                <a:highlight>
+                  <a:srgbClr val="FFFF00"/>
+                </a:highlight>
+              </a:rPr>
+              <a:t>page.got</a:t>
+            </a:r>
+            <a:r>
+              <a:rPr lang="en-IN" dirty="0">
+                <a:highlight>
+                  <a:srgbClr val="FFFF00"/>
+                </a:highlight>
+              </a:rPr>
+              <a:t>(&lt;URL&gt;);</a:t>
             </a:r>
           </a:p>
           <a:p>
@@ -28814,32 +30019,60 @@
           <a:lstStyle/>
           <a:p>
             <a:r>
-              <a:rPr lang="en-IN" dirty="0"/>
+              <a:rPr lang="en-IN" dirty="0">
+                <a:highlight>
+                  <a:srgbClr val="FFFF00"/>
+                </a:highlight>
+              </a:rPr>
               <a:t>expect(success).</a:t>
             </a:r>
             <a:r>
-              <a:rPr lang="en-IN" dirty="0" err="1"/>
+              <a:rPr lang="en-IN" dirty="0" err="1">
+                <a:highlight>
+                  <a:srgbClr val="FFFF00"/>
+                </a:highlight>
+              </a:rPr>
               <a:t>toBeTruthy</a:t>
             </a:r>
             <a:r>
-              <a:rPr lang="en-IN" dirty="0"/>
+              <a:rPr lang="en-IN" dirty="0">
+                <a:highlight>
+                  <a:srgbClr val="FFFF00"/>
+                </a:highlight>
+              </a:rPr>
               <a:t>();</a:t>
             </a:r>
           </a:p>
           <a:p>
-            <a:endParaRPr lang="en-US" dirty="0"/>
-          </a:p>
-          <a:p>
-            <a:r>
-              <a:rPr lang="en-US" dirty="0"/>
+            <a:endParaRPr lang="en-US" dirty="0">
+              <a:highlight>
+                <a:srgbClr val="FFFF00"/>
+              </a:highlight>
+            </a:endParaRPr>
+          </a:p>
+          <a:p>
+            <a:r>
+              <a:rPr lang="en-US" dirty="0">
+                <a:highlight>
+                  <a:srgbClr val="FFFF00"/>
+                </a:highlight>
+              </a:rPr>
               <a:t>await expect(page).</a:t>
             </a:r>
             <a:r>
-              <a:rPr lang="en-US" dirty="0" err="1"/>
+              <a:rPr lang="en-US" dirty="0" err="1">
+                <a:highlight>
+                  <a:srgbClr val="FFFF00"/>
+                </a:highlight>
+              </a:rPr>
               <a:t>toHaveTitle</a:t>
             </a:r>
             <a:r>
-              <a:rPr lang="en-US" dirty="0"/>
+              <a:rPr lang="en-US" dirty="0">
+                <a:highlight>
+                  <a:srgbClr val="FFFF00"/>
+                </a:highlight>
+              </a:rPr>
               <a:t>(/Playwright/);</a:t>
             </a:r>
           </a:p>
@@ -28978,13 +30211,8 @@
           <a:p>
             <a:r>
               <a:rPr lang="en-US" dirty="0"/>
-              <a:t>Session must be interactive, trainer and trainees </a:t>
-            </a:r>
-            <a:r>
-              <a:rPr lang="en-US"/>
-              <a:t>must interact – It wont be a one way</a:t>
-            </a:r>
-            <a:endParaRPr lang="en-US" dirty="0"/>
+              <a:t>Session must be interactive, trainer and trainees must interact – It wont be a one way</a:t>
+            </a:r>
           </a:p>
           <a:p>
             <a:pPr lvl="1"/>

</xml_diff>

<commit_message>
button load workflow added
</commit_message>
<xml_diff>
--- a/Playwright Automation training PPT.pptx
+++ b/Playwright Automation training PPT.pptx
@@ -583,7 +583,7 @@
           <a:p>
             <a:fld id="{277C0EA7-384B-48A7-9E6B-FE2AA406287D}" type="datetimeFigureOut">
               <a:rPr lang="en-IN" smtClean="0"/>
-              <a:t>12-03-2024</a:t>
+              <a:t>14-03-2024</a:t>
             </a:fld>
             <a:endParaRPr lang="en-IN"/>
           </a:p>
@@ -794,7 +794,7 @@
           <a:p>
             <a:fld id="{277C0EA7-384B-48A7-9E6B-FE2AA406287D}" type="datetimeFigureOut">
               <a:rPr lang="en-IN" smtClean="0"/>
-              <a:t>12-03-2024</a:t>
+              <a:t>14-03-2024</a:t>
             </a:fld>
             <a:endParaRPr lang="en-IN"/>
           </a:p>
@@ -1009,7 +1009,7 @@
           <a:p>
             <a:fld id="{277C0EA7-384B-48A7-9E6B-FE2AA406287D}" type="datetimeFigureOut">
               <a:rPr lang="en-IN" smtClean="0"/>
-              <a:t>12-03-2024</a:t>
+              <a:t>14-03-2024</a:t>
             </a:fld>
             <a:endParaRPr lang="en-IN"/>
           </a:p>
@@ -1210,7 +1210,7 @@
           <a:p>
             <a:fld id="{277C0EA7-384B-48A7-9E6B-FE2AA406287D}" type="datetimeFigureOut">
               <a:rPr lang="en-IN" smtClean="0"/>
-              <a:t>12-03-2024</a:t>
+              <a:t>14-03-2024</a:t>
             </a:fld>
             <a:endParaRPr lang="en-IN"/>
           </a:p>
@@ -1489,7 +1489,7 @@
           <a:p>
             <a:fld id="{277C0EA7-384B-48A7-9E6B-FE2AA406287D}" type="datetimeFigureOut">
               <a:rPr lang="en-IN" smtClean="0"/>
-              <a:t>12-03-2024</a:t>
+              <a:t>14-03-2024</a:t>
             </a:fld>
             <a:endParaRPr lang="en-IN"/>
           </a:p>
@@ -1757,7 +1757,7 @@
           <a:p>
             <a:fld id="{277C0EA7-384B-48A7-9E6B-FE2AA406287D}" type="datetimeFigureOut">
               <a:rPr lang="en-IN" smtClean="0"/>
-              <a:t>12-03-2024</a:t>
+              <a:t>14-03-2024</a:t>
             </a:fld>
             <a:endParaRPr lang="en-IN"/>
           </a:p>
@@ -2173,7 +2173,7 @@
           <a:p>
             <a:fld id="{277C0EA7-384B-48A7-9E6B-FE2AA406287D}" type="datetimeFigureOut">
               <a:rPr lang="en-IN" smtClean="0"/>
-              <a:t>12-03-2024</a:t>
+              <a:t>14-03-2024</a:t>
             </a:fld>
             <a:endParaRPr lang="en-IN"/>
           </a:p>
@@ -2322,7 +2322,7 @@
           <a:p>
             <a:fld id="{277C0EA7-384B-48A7-9E6B-FE2AA406287D}" type="datetimeFigureOut">
               <a:rPr lang="en-IN" smtClean="0"/>
-              <a:t>12-03-2024</a:t>
+              <a:t>14-03-2024</a:t>
             </a:fld>
             <a:endParaRPr lang="en-IN"/>
           </a:p>
@@ -2448,7 +2448,7 @@
           <a:p>
             <a:fld id="{277C0EA7-384B-48A7-9E6B-FE2AA406287D}" type="datetimeFigureOut">
               <a:rPr lang="en-IN" smtClean="0"/>
-              <a:t>12-03-2024</a:t>
+              <a:t>14-03-2024</a:t>
             </a:fld>
             <a:endParaRPr lang="en-IN"/>
           </a:p>
@@ -2699,7 +2699,7 @@
           <a:p>
             <a:fld id="{277C0EA7-384B-48A7-9E6B-FE2AA406287D}" type="datetimeFigureOut">
               <a:rPr lang="en-IN" smtClean="0"/>
-              <a:t>12-03-2024</a:t>
+              <a:t>14-03-2024</a:t>
             </a:fld>
             <a:endParaRPr lang="en-IN"/>
           </a:p>
@@ -3144,7 +3144,7 @@
           <a:p>
             <a:fld id="{277C0EA7-384B-48A7-9E6B-FE2AA406287D}" type="datetimeFigureOut">
               <a:rPr lang="en-IN" smtClean="0"/>
-              <a:t>12-03-2024</a:t>
+              <a:t>14-03-2024</a:t>
             </a:fld>
             <a:endParaRPr lang="en-IN"/>
           </a:p>
@@ -3470,7 +3470,7 @@
           <a:p>
             <a:fld id="{277C0EA7-384B-48A7-9E6B-FE2AA406287D}" type="datetimeFigureOut">
               <a:rPr lang="en-IN" smtClean="0"/>
-              <a:t>12-03-2024</a:t>
+              <a:t>14-03-2024</a:t>
             </a:fld>
             <a:endParaRPr lang="en-IN"/>
           </a:p>
@@ -4410,12 +4410,18 @@
         </p:nvSpPr>
         <p:spPr/>
         <p:txBody>
-          <a:bodyPr/>
-          <a:lstStyle/>
-          <a:p>
-            <a:r>
-              <a:rPr lang="en-US" dirty="0"/>
-              <a:t>Playwright Automation</a:t>
+          <a:bodyPr>
+            <a:normAutofit fontScale="90000"/>
+          </a:bodyPr>
+          <a:lstStyle/>
+          <a:p>
+            <a:r>
+              <a:rPr lang="en-US" dirty="0"/>
+              <a:t>Playwright Automation using </a:t>
+            </a:r>
+            <a:r>
+              <a:rPr lang="en-US" dirty="0" err="1"/>
+              <a:t>Javascript</a:t>
             </a:r>
             <a:endParaRPr lang="en-IN" dirty="0"/>
           </a:p>
@@ -32581,18 +32587,23 @@
           <a:p>
             <a:r>
               <a:rPr lang="en-US" dirty="0"/>
-              <a:t>This Training will only cover automation using playwright</a:t>
-            </a:r>
-          </a:p>
-          <a:p>
-            <a:r>
-              <a:rPr lang="en-US" dirty="0"/>
-              <a:t>This training is not intended to teach </a:t>
+              <a:t>This Training will only cover automation using playwright &amp; </a:t>
             </a:r>
             <a:r>
               <a:rPr lang="en-US" dirty="0" err="1"/>
               <a:t>Javascript</a:t>
             </a:r>
+            <a:endParaRPr lang="en-US" dirty="0"/>
+          </a:p>
+          <a:p>
+            <a:r>
+              <a:rPr lang="en-US" dirty="0"/>
+              <a:t>This training is not intended to teach </a:t>
+            </a:r>
+            <a:r>
+              <a:rPr lang="en-US" dirty="0" err="1"/>
+              <a:t>Javascript</a:t>
+            </a:r>
             <a:r>
               <a:rPr lang="en-US" dirty="0"/>
               <a:t>, html OR </a:t>
@@ -32624,6 +32635,12 @@
             <a:r>
               <a:rPr lang="en-US" dirty="0"/>
               <a:t>Each single PPT &amp; all training material is self created by trainer, not taken from any readymade template / website / any other source</a:t>
+            </a:r>
+          </a:p>
+          <a:p>
+            <a:r>
+              <a:rPr lang="en-US" dirty="0"/>
+              <a:t>We will discuss and do everything from scratch</a:t>
             </a:r>
           </a:p>
           <a:p>
@@ -32906,6 +32923,55 @@
                       </p:childTnLst>
                     </p:cTn>
                   </p:par>
+                  <p:par>
+                    <p:cTn id="23" fill="hold">
+                      <p:stCondLst>
+                        <p:cond delay="indefinite"/>
+                      </p:stCondLst>
+                      <p:childTnLst>
+                        <p:par>
+                          <p:cTn id="24" fill="hold">
+                            <p:stCondLst>
+                              <p:cond delay="0"/>
+                            </p:stCondLst>
+                            <p:childTnLst>
+                              <p:par>
+                                <p:cTn id="25" presetID="1" presetClass="entr" presetSubtype="0" fill="hold" grpId="0" nodeType="clickEffect">
+                                  <p:stCondLst>
+                                    <p:cond delay="0"/>
+                                  </p:stCondLst>
+                                  <p:childTnLst>
+                                    <p:set>
+                                      <p:cBhvr>
+                                        <p:cTn id="26" dur="1" fill="hold">
+                                          <p:stCondLst>
+                                            <p:cond delay="0"/>
+                                          </p:stCondLst>
+                                        </p:cTn>
+                                        <p:tgtEl>
+                                          <p:spTgt spid="3">
+                                            <p:txEl>
+                                              <p:pRg st="5" end="5"/>
+                                            </p:txEl>
+                                          </p:spTgt>
+                                        </p:tgtEl>
+                                        <p:attrNameLst>
+                                          <p:attrName>style.visibility</p:attrName>
+                                        </p:attrNameLst>
+                                      </p:cBhvr>
+                                      <p:to>
+                                        <p:strVal val="visible"/>
+                                      </p:to>
+                                    </p:set>
+                                  </p:childTnLst>
+                                </p:cTn>
+                              </p:par>
+                            </p:childTnLst>
+                          </p:cTn>
+                        </p:par>
+                      </p:childTnLst>
+                    </p:cTn>
+                  </p:par>
                 </p:childTnLst>
               </p:cTn>
               <p:prevCondLst>
@@ -39454,7 +39520,7 @@
           <a:p>
             <a:r>
               <a:rPr lang="en-US" dirty="0"/>
-              <a:t>your trainer</a:t>
+              <a:t>Know your trainer</a:t>
             </a:r>
             <a:endParaRPr lang="en-IN" dirty="0"/>
           </a:p>

</xml_diff>